<commit_message>
slides and exercises update
</commit_message>
<xml_diff>
--- a/Lecture 5/ae.pptx
+++ b/Lecture 5/ae.pptx
@@ -8632,6 +8632,30 @@
         <p:nvPr/>
       </p:nvGrpSpPr>
       <p:grpSpPr/>
+      <p:pic>
+        <p:nvPicPr>
+          <p:cNvPr id="4" name="Picture 3"/>
+          <p:cNvPicPr>
+            <a:picLocks noChangeAspect="1"/>
+          </p:cNvPicPr>
+          <p:nvPr/>
+        </p:nvPicPr>
+        <p:blipFill>
+          <a:blip r:embed="rId1"/>
+          <a:stretch>
+            <a:fillRect/>
+          </a:stretch>
+        </p:blipFill>
+        <p:spPr>
+          <a:xfrm>
+            <a:off x="1089660" y="2079625"/>
+            <a:ext cx="9912350" cy="4006850"/>
+          </a:xfrm>
+          <a:prstGeom prst="rect">
+            <a:avLst/>
+          </a:prstGeom>
+        </p:spPr>
+      </p:pic>
       <p:sp>
         <p:nvSpPr>
           <p:cNvPr id="2" name="Title 1"/>
@@ -8656,30 +8680,6 @@
           </a:p>
         </p:txBody>
       </p:sp>
-      <p:pic>
-        <p:nvPicPr>
-          <p:cNvPr id="11" name="Picture 10"/>
-          <p:cNvPicPr>
-            <a:picLocks noChangeAspect="1"/>
-          </p:cNvPicPr>
-          <p:nvPr/>
-        </p:nvPicPr>
-        <p:blipFill>
-          <a:blip r:embed="rId1"/>
-          <a:stretch>
-            <a:fillRect/>
-          </a:stretch>
-        </p:blipFill>
-        <p:spPr>
-          <a:xfrm>
-            <a:off x="922655" y="1833245"/>
-            <a:ext cx="9990455" cy="4309110"/>
-          </a:xfrm>
-          <a:prstGeom prst="rect">
-            <a:avLst/>
-          </a:prstGeom>
-        </p:spPr>
-      </p:pic>
       <p:cxnSp>
         <p:nvCxnSpPr>
           <p:cNvPr id="12" name="Straight Connector 11"/>
@@ -8688,8 +8688,8 @@
         </p:nvCxnSpPr>
         <p:spPr>
           <a:xfrm>
-            <a:off x="1974850" y="4292600"/>
-            <a:ext cx="8750300" cy="0"/>
+            <a:off x="1974850" y="4323080"/>
+            <a:ext cx="8918575" cy="0"/>
           </a:xfrm>
           <a:prstGeom prst="line">
             <a:avLst/>
@@ -8724,7 +8724,7 @@
         </p:nvCxnSpPr>
         <p:spPr>
           <a:xfrm>
-            <a:off x="2362200" y="4851400"/>
+            <a:off x="2392680" y="4851400"/>
             <a:ext cx="590550" cy="0"/>
           </a:xfrm>
           <a:prstGeom prst="line">
@@ -8760,7 +8760,7 @@
         </p:nvCxnSpPr>
         <p:spPr>
           <a:xfrm>
-            <a:off x="4165600" y="4851400"/>
+            <a:off x="4104640" y="4851400"/>
             <a:ext cx="590550" cy="0"/>
           </a:xfrm>
           <a:prstGeom prst="line">

</xml_diff>